<commit_message>
Updated presentations #3 and #4
</commit_message>
<xml_diff>
--- a/Presentation/lesson-03.pptx
+++ b/Presentation/lesson-03.pptx
@@ -303,7 +303,7 @@
           <a:p>
             <a:fld id="{6D622FCB-595C-4A19-9DA3-A5F2C1EA723F}" type="datetimeFigureOut">
               <a:rPr lang="en-US" smtClean="0"/>
-              <a:t>11/3/2013</a:t>
+              <a:t>4/21/2014</a:t>
             </a:fld>
             <a:endParaRPr lang="en-US"/>
           </a:p>
@@ -473,7 +473,7 @@
           <a:p>
             <a:fld id="{6D622FCB-595C-4A19-9DA3-A5F2C1EA723F}" type="datetimeFigureOut">
               <a:rPr lang="en-US" smtClean="0"/>
-              <a:t>11/3/2013</a:t>
+              <a:t>4/21/2014</a:t>
             </a:fld>
             <a:endParaRPr lang="en-US"/>
           </a:p>
@@ -653,7 +653,7 @@
           <a:p>
             <a:fld id="{6D622FCB-595C-4A19-9DA3-A5F2C1EA723F}" type="datetimeFigureOut">
               <a:rPr lang="en-US" smtClean="0"/>
-              <a:t>11/3/2013</a:t>
+              <a:t>4/21/2014</a:t>
             </a:fld>
             <a:endParaRPr lang="en-US"/>
           </a:p>
@@ -2038,7 +2038,7 @@
           <a:p>
             <a:fld id="{6D622FCB-595C-4A19-9DA3-A5F2C1EA723F}" type="datetimeFigureOut">
               <a:rPr lang="en-US" smtClean="0"/>
-              <a:t>11/3/2013</a:t>
+              <a:t>4/21/2014</a:t>
             </a:fld>
             <a:endParaRPr lang="en-US"/>
           </a:p>
@@ -2911,7 +2911,7 @@
                 </a:solidFill>
               </a:rPr>
               <a:pPr/>
-              <a:t>03.11.2013</a:t>
+              <a:t>21.04.2014</a:t>
             </a:fld>
             <a:endParaRPr lang="ru-RU">
               <a:solidFill>
@@ -3182,7 +3182,7 @@
           <a:p>
             <a:fld id="{6D622FCB-595C-4A19-9DA3-A5F2C1EA723F}" type="datetimeFigureOut">
               <a:rPr lang="en-US" smtClean="0"/>
-              <a:t>11/3/2013</a:t>
+              <a:t>4/21/2014</a:t>
             </a:fld>
             <a:endParaRPr lang="en-US"/>
           </a:p>
@@ -3470,7 +3470,7 @@
           <a:p>
             <a:fld id="{6D622FCB-595C-4A19-9DA3-A5F2C1EA723F}" type="datetimeFigureOut">
               <a:rPr lang="en-US" smtClean="0"/>
-              <a:t>11/3/2013</a:t>
+              <a:t>4/21/2014</a:t>
             </a:fld>
             <a:endParaRPr lang="en-US"/>
           </a:p>
@@ -3892,7 +3892,7 @@
           <a:p>
             <a:fld id="{6D622FCB-595C-4A19-9DA3-A5F2C1EA723F}" type="datetimeFigureOut">
               <a:rPr lang="en-US" smtClean="0"/>
-              <a:t>11/3/2013</a:t>
+              <a:t>4/21/2014</a:t>
             </a:fld>
             <a:endParaRPr lang="en-US"/>
           </a:p>
@@ -4010,7 +4010,7 @@
           <a:p>
             <a:fld id="{6D622FCB-595C-4A19-9DA3-A5F2C1EA723F}" type="datetimeFigureOut">
               <a:rPr lang="en-US" smtClean="0"/>
-              <a:t>11/3/2013</a:t>
+              <a:t>4/21/2014</a:t>
             </a:fld>
             <a:endParaRPr lang="en-US"/>
           </a:p>
@@ -4105,7 +4105,7 @@
           <a:p>
             <a:fld id="{6D622FCB-595C-4A19-9DA3-A5F2C1EA723F}" type="datetimeFigureOut">
               <a:rPr lang="en-US" smtClean="0"/>
-              <a:t>11/3/2013</a:t>
+              <a:t>4/21/2014</a:t>
             </a:fld>
             <a:endParaRPr lang="en-US"/>
           </a:p>
@@ -4382,7 +4382,7 @@
           <a:p>
             <a:fld id="{6D622FCB-595C-4A19-9DA3-A5F2C1EA723F}" type="datetimeFigureOut">
               <a:rPr lang="en-US" smtClean="0"/>
-              <a:t>11/3/2013</a:t>
+              <a:t>4/21/2014</a:t>
             </a:fld>
             <a:endParaRPr lang="en-US"/>
           </a:p>
@@ -4635,7 +4635,7 @@
           <a:p>
             <a:fld id="{6D622FCB-595C-4A19-9DA3-A5F2C1EA723F}" type="datetimeFigureOut">
               <a:rPr lang="en-US" smtClean="0"/>
-              <a:t>11/3/2013</a:t>
+              <a:t>4/21/2014</a:t>
             </a:fld>
             <a:endParaRPr lang="en-US"/>
           </a:p>
@@ -4848,7 +4848,7 @@
           <a:p>
             <a:fld id="{6D622FCB-595C-4A19-9DA3-A5F2C1EA723F}" type="datetimeFigureOut">
               <a:rPr lang="en-US" smtClean="0"/>
-              <a:t>11/3/2013</a:t>
+              <a:t>4/21/2014</a:t>
             </a:fld>
             <a:endParaRPr lang="en-US"/>
           </a:p>
@@ -5374,7 +5374,7 @@
                 </a:solidFill>
               </a:rPr>
               <a:pPr/>
-              <a:t>03.11.2013</a:t>
+              <a:t>21.04.2014</a:t>
             </a:fld>
             <a:endParaRPr lang="ru-RU">
               <a:solidFill>
@@ -6053,54 +6053,90 @@
             </a:pPr>
             <a:r>
               <a:rPr lang="ru-RU" dirty="0" smtClean="0"/>
-              <a:t>Под кодировкой понимается сопоставление символу числового кода. Это необходимо так как компьютер умеет оперировать только числами. Кодироки делятся на однобайтовые и многобайтовые. В однобайтовой кодировке можно представить не больше чем 256 символов, что зачастую лишает возможности иметь в одной строке символы из разных алфавитов. Многобайтовые кодировки, очевидно, способны представить гораздо больше символов.</a:t>
-            </a:r>
+              <a:t>Под кодировкой понимается сопоставление символу числового кода. Это необходимо так как компьютер умеет оперировать только числами. Кодироки делятся на однобайтовые и многобайтовые. В однобайтовой кодировке можно представить не больше чем 256 символов, что зачастую лишает возможности иметь в одной строке символы из разных алфавитов. Многобайтовые кодировки, очевидно, способны представить гораздо больше символов</a:t>
+            </a:r>
+            <a:r>
+              <a:rPr lang="ru-RU" dirty="0" smtClean="0"/>
+              <a:t>.</a:t>
+            </a:r>
+            <a:endParaRPr lang="en-US" dirty="0" smtClean="0"/>
           </a:p>
           <a:p>
             <a:pPr marL="0" indent="0">
               <a:buNone/>
             </a:pPr>
+            <a:endParaRPr lang="en-US" dirty="0" smtClean="0"/>
+          </a:p>
+          <a:p>
             <a:r>
               <a:rPr lang="ru-RU" dirty="0" smtClean="0"/>
-              <a:t>Примеры однобайтовых кодировок: </a:t>
+              <a:t>Однобайтовые кодировки: </a:t>
             </a:r>
             <a:r>
               <a:rPr lang="en-US" dirty="0" smtClean="0"/>
-              <a:t>windows-1251, koi8-r, dos866, ASCII (</a:t>
+              <a:t> </a:t>
+            </a:r>
+            <a:r>
+              <a:rPr lang="en-US" dirty="0"/>
+              <a:t>ISO 8859-1, </a:t>
+            </a:r>
+            <a:r>
+              <a:rPr lang="en-US" dirty="0" smtClean="0"/>
+              <a:t>EBCDIC, Windows-1251</a:t>
+            </a:r>
+            <a:r>
+              <a:rPr lang="en-US" dirty="0" smtClean="0"/>
+              <a:t>, koi8-r, dos866, ASCII (</a:t>
             </a:r>
             <a:r>
               <a:rPr lang="ru-RU" dirty="0" smtClean="0"/>
-              <a:t>7-битовая кодировка).</a:t>
-            </a:r>
+              <a:t>7-битовая кодировка) и другие.</a:t>
+            </a:r>
+          </a:p>
+          <a:p>
+            <a:r>
+              <a:rPr lang="ru-RU" dirty="0" err="1" smtClean="0"/>
+              <a:t>Многобайтовые</a:t>
+            </a:r>
+            <a:r>
+              <a:rPr lang="ru-RU" dirty="0" smtClean="0"/>
+              <a:t> кодировки: </a:t>
+            </a:r>
+            <a:r>
+              <a:rPr lang="ru-RU" dirty="0" smtClean="0"/>
+              <a:t>семейство </a:t>
+            </a:r>
+            <a:r>
+              <a:rPr lang="en-US" dirty="0" smtClean="0"/>
+              <a:t>Unicode (UTF-8, UTF-16, UTF-32), GBK (</a:t>
+            </a:r>
+            <a:r>
+              <a:rPr lang="ru-RU" dirty="0" smtClean="0"/>
+              <a:t>китайский)</a:t>
+            </a:r>
+            <a:r>
+              <a:rPr lang="en-US" dirty="0"/>
+              <a:t>, </a:t>
+            </a:r>
+            <a:r>
+              <a:rPr lang="en-US" dirty="0" smtClean="0"/>
+              <a:t>ISO-2022-JP (</a:t>
+            </a:r>
+            <a:r>
+              <a:rPr lang="ru-RU" dirty="0" smtClean="0"/>
+              <a:t>японский) и </a:t>
+            </a:r>
+            <a:r>
+              <a:rPr lang="ru-RU" dirty="0" smtClean="0"/>
+              <a:t>другие.</a:t>
+            </a:r>
+            <a:endParaRPr lang="en-US" dirty="0" smtClean="0"/>
           </a:p>
           <a:p>
             <a:pPr marL="0" indent="0">
               <a:buNone/>
             </a:pPr>
-            <a:r>
-              <a:rPr lang="ru-RU" dirty="0" smtClean="0"/>
-              <a:t>Примеры многобайтовых кодировок: семейство </a:t>
-            </a:r>
-            <a:r>
-              <a:rPr lang="en-US" dirty="0" smtClean="0"/>
-              <a:t>Unicode (UTF-8, UTF-16, UTF-32), GBK (</a:t>
-            </a:r>
-            <a:r>
-              <a:rPr lang="ru-RU" dirty="0" smtClean="0"/>
-              <a:t>китайский)</a:t>
-            </a:r>
-            <a:r>
-              <a:rPr lang="en-US" dirty="0"/>
-              <a:t>, </a:t>
-            </a:r>
-            <a:r>
-              <a:rPr lang="en-US" dirty="0" smtClean="0"/>
-              <a:t>ISO-2022-JP (</a:t>
-            </a:r>
-            <a:r>
-              <a:rPr lang="ru-RU" dirty="0" smtClean="0"/>
-              <a:t>японский) и другие.</a:t>
-            </a:r>
+            <a:endParaRPr lang="en-US" dirty="0"/>
           </a:p>
           <a:p>
             <a:pPr marL="0" indent="0">
@@ -6108,7 +6144,11 @@
             </a:pPr>
             <a:r>
               <a:rPr lang="ru-RU" dirty="0" smtClean="0"/>
-              <a:t>Самой популярной многобайтовой кодировкой является </a:t>
+              <a:t>Самой </a:t>
+            </a:r>
+            <a:r>
+              <a:rPr lang="ru-RU" dirty="0" smtClean="0"/>
+              <a:t>популярной многобайтовой кодировкой является </a:t>
             </a:r>
             <a:r>
               <a:rPr lang="en-US" dirty="0" smtClean="0"/>
@@ -6264,7 +6304,6 @@
                 <a:rPr lang="ru-RU" sz="3200" dirty="0" smtClean="0"/>
                 <a:t>(верхняя часть)</a:t>
               </a:r>
-              <a:endParaRPr lang="ru-RU" sz="3200" dirty="0" smtClean="0"/>
             </a:p>
           </p:txBody>
         </p:sp>
@@ -6308,17 +6347,12 @@
               <a:pPr algn="ctr"/>
               <a:r>
                 <a:rPr lang="en-US" sz="3200" dirty="0" smtClean="0"/>
-                <a:t>Windows-1251</a:t>
-              </a:r>
-              <a:r>
-                <a:rPr lang="en-US" sz="3200" dirty="0" smtClean="0"/>
-                <a:t> </a:t>
+                <a:t>Windows-1251 </a:t>
               </a:r>
               <a:r>
                 <a:rPr lang="ru-RU" sz="3200" dirty="0" smtClean="0"/>
                 <a:t>(верхняя часть)</a:t>
               </a:r>
-              <a:endParaRPr lang="ru-RU" sz="3200" dirty="0" smtClean="0"/>
             </a:p>
           </p:txBody>
         </p:sp>
@@ -6548,11 +6582,11 @@
   <p:clrMapOvr>
     <a:masterClrMapping/>
   </p:clrMapOvr>
-  <mc:AlternateContent xmlns:mc="http://schemas.openxmlformats.org/markup-compatibility/2006">
-    <mc:Choice xmlns:p14="http://schemas.microsoft.com/office/powerpoint/2010/main" Requires="p14">
+  <mc:AlternateContent xmlns:mc="http://schemas.openxmlformats.org/markup-compatibility/2006" xmlns:p14="http://schemas.microsoft.com/office/powerpoint/2010/main">
+    <mc:Choice Requires="p14">
       <p:transition p14:dur="10"/>
     </mc:Choice>
-    <mc:Fallback>
+    <mc:Fallback xmlns="">
       <p:transition/>
     </mc:Fallback>
   </mc:AlternateContent>

</xml_diff>

<commit_message>
More info about strings and encodings
</commit_message>
<xml_diff>
--- a/Presentation/lesson-03.pptx
+++ b/Presentation/lesson-03.pptx
@@ -16,11 +16,12 @@
     <p:sldId id="261" r:id="rId10"/>
     <p:sldId id="262" r:id="rId11"/>
     <p:sldId id="272" r:id="rId12"/>
-    <p:sldId id="273" r:id="rId13"/>
-    <p:sldId id="263" r:id="rId14"/>
-    <p:sldId id="264" r:id="rId15"/>
-    <p:sldId id="265" r:id="rId16"/>
-    <p:sldId id="271" r:id="rId17"/>
+    <p:sldId id="274" r:id="rId13"/>
+    <p:sldId id="273" r:id="rId14"/>
+    <p:sldId id="263" r:id="rId15"/>
+    <p:sldId id="264" r:id="rId16"/>
+    <p:sldId id="265" r:id="rId17"/>
+    <p:sldId id="271" r:id="rId18"/>
   </p:sldIdLst>
   <p:sldSz cx="9144000" cy="6858000" type="screen4x3"/>
   <p:notesSz cx="6858000" cy="9144000"/>
@@ -303,7 +304,7 @@
           <a:p>
             <a:fld id="{6D622FCB-595C-4A19-9DA3-A5F2C1EA723F}" type="datetimeFigureOut">
               <a:rPr lang="en-US" smtClean="0"/>
-              <a:t>4/21/2014</a:t>
+              <a:t>5/18/2014</a:t>
             </a:fld>
             <a:endParaRPr lang="en-US"/>
           </a:p>
@@ -473,7 +474,7 @@
           <a:p>
             <a:fld id="{6D622FCB-595C-4A19-9DA3-A5F2C1EA723F}" type="datetimeFigureOut">
               <a:rPr lang="en-US" smtClean="0"/>
-              <a:t>4/21/2014</a:t>
+              <a:t>5/18/2014</a:t>
             </a:fld>
             <a:endParaRPr lang="en-US"/>
           </a:p>
@@ -653,7 +654,7 @@
           <a:p>
             <a:fld id="{6D622FCB-595C-4A19-9DA3-A5F2C1EA723F}" type="datetimeFigureOut">
               <a:rPr lang="en-US" smtClean="0"/>
-              <a:t>4/21/2014</a:t>
+              <a:t>5/18/2014</a:t>
             </a:fld>
             <a:endParaRPr lang="en-US"/>
           </a:p>
@@ -2038,7 +2039,7 @@
           <a:p>
             <a:fld id="{6D622FCB-595C-4A19-9DA3-A5F2C1EA723F}" type="datetimeFigureOut">
               <a:rPr lang="en-US" smtClean="0"/>
-              <a:t>4/21/2014</a:t>
+              <a:t>5/18/2014</a:t>
             </a:fld>
             <a:endParaRPr lang="en-US"/>
           </a:p>
@@ -2911,7 +2912,7 @@
                 </a:solidFill>
               </a:rPr>
               <a:pPr/>
-              <a:t>21.04.2014</a:t>
+              <a:t>18.05.2014</a:t>
             </a:fld>
             <a:endParaRPr lang="ru-RU">
               <a:solidFill>
@@ -3182,7 +3183,7 @@
           <a:p>
             <a:fld id="{6D622FCB-595C-4A19-9DA3-A5F2C1EA723F}" type="datetimeFigureOut">
               <a:rPr lang="en-US" smtClean="0"/>
-              <a:t>4/21/2014</a:t>
+              <a:t>5/18/2014</a:t>
             </a:fld>
             <a:endParaRPr lang="en-US"/>
           </a:p>
@@ -3470,7 +3471,7 @@
           <a:p>
             <a:fld id="{6D622FCB-595C-4A19-9DA3-A5F2C1EA723F}" type="datetimeFigureOut">
               <a:rPr lang="en-US" smtClean="0"/>
-              <a:t>4/21/2014</a:t>
+              <a:t>5/18/2014</a:t>
             </a:fld>
             <a:endParaRPr lang="en-US"/>
           </a:p>
@@ -3892,7 +3893,7 @@
           <a:p>
             <a:fld id="{6D622FCB-595C-4A19-9DA3-A5F2C1EA723F}" type="datetimeFigureOut">
               <a:rPr lang="en-US" smtClean="0"/>
-              <a:t>4/21/2014</a:t>
+              <a:t>5/18/2014</a:t>
             </a:fld>
             <a:endParaRPr lang="en-US"/>
           </a:p>
@@ -4010,7 +4011,7 @@
           <a:p>
             <a:fld id="{6D622FCB-595C-4A19-9DA3-A5F2C1EA723F}" type="datetimeFigureOut">
               <a:rPr lang="en-US" smtClean="0"/>
-              <a:t>4/21/2014</a:t>
+              <a:t>5/18/2014</a:t>
             </a:fld>
             <a:endParaRPr lang="en-US"/>
           </a:p>
@@ -4105,7 +4106,7 @@
           <a:p>
             <a:fld id="{6D622FCB-595C-4A19-9DA3-A5F2C1EA723F}" type="datetimeFigureOut">
               <a:rPr lang="en-US" smtClean="0"/>
-              <a:t>4/21/2014</a:t>
+              <a:t>5/18/2014</a:t>
             </a:fld>
             <a:endParaRPr lang="en-US"/>
           </a:p>
@@ -4382,7 +4383,7 @@
           <a:p>
             <a:fld id="{6D622FCB-595C-4A19-9DA3-A5F2C1EA723F}" type="datetimeFigureOut">
               <a:rPr lang="en-US" smtClean="0"/>
-              <a:t>4/21/2014</a:t>
+              <a:t>5/18/2014</a:t>
             </a:fld>
             <a:endParaRPr lang="en-US"/>
           </a:p>
@@ -4635,7 +4636,7 @@
           <a:p>
             <a:fld id="{6D622FCB-595C-4A19-9DA3-A5F2C1EA723F}" type="datetimeFigureOut">
               <a:rPr lang="en-US" smtClean="0"/>
-              <a:t>4/21/2014</a:t>
+              <a:t>5/18/2014</a:t>
             </a:fld>
             <a:endParaRPr lang="en-US"/>
           </a:p>
@@ -4848,7 +4849,7 @@
           <a:p>
             <a:fld id="{6D622FCB-595C-4A19-9DA3-A5F2C1EA723F}" type="datetimeFigureOut">
               <a:rPr lang="en-US" smtClean="0"/>
-              <a:t>4/21/2014</a:t>
+              <a:t>5/18/2014</a:t>
             </a:fld>
             <a:endParaRPr lang="en-US"/>
           </a:p>
@@ -5374,7 +5375,7 @@
                 </a:solidFill>
               </a:rPr>
               <a:pPr/>
-              <a:t>21.04.2014</a:t>
+              <a:t>18.05.2014</a:t>
             </a:fld>
             <a:endParaRPr lang="ru-RU">
               <a:solidFill>
@@ -6053,11 +6054,7 @@
             </a:pPr>
             <a:r>
               <a:rPr lang="ru-RU" dirty="0" smtClean="0"/>
-              <a:t>Под кодировкой понимается сопоставление символу числового кода. Это необходимо так как компьютер умеет оперировать только числами. Кодироки делятся на однобайтовые и многобайтовые. В однобайтовой кодировке можно представить не больше чем 256 символов, что зачастую лишает возможности иметь в одной строке символы из разных алфавитов. Многобайтовые кодировки, очевидно, способны представить гораздо больше символов</a:t>
-            </a:r>
-            <a:r>
-              <a:rPr lang="ru-RU" dirty="0" smtClean="0"/>
-              <a:t>.</a:t>
+              <a:t>Под кодировкой понимается сопоставление символу числового кода. Это необходимо так как компьютер умеет оперировать только числами. Кодироки делятся на однобайтовые и многобайтовые. В однобайтовой кодировке можно представить не больше чем 256 символов, что зачастую лишает возможности иметь в одной строке символы из разных алфавитов. Многобайтовые кодировки, очевидно, способны представить гораздо больше символов.</a:t>
             </a:r>
             <a:endParaRPr lang="en-US" dirty="0" smtClean="0"/>
           </a:p>
@@ -6082,11 +6079,7 @@
             </a:r>
             <a:r>
               <a:rPr lang="en-US" dirty="0" smtClean="0"/>
-              <a:t>EBCDIC, Windows-1251</a:t>
-            </a:r>
-            <a:r>
-              <a:rPr lang="en-US" dirty="0" smtClean="0"/>
-              <a:t>, koi8-r, dos866, ASCII (</a:t>
+              <a:t>EBCDIC, Windows-1251, koi8-r, dos866, ASCII (</a:t>
             </a:r>
             <a:r>
               <a:rPr lang="ru-RU" dirty="0" smtClean="0"/>
@@ -6100,11 +6093,7 @@
             </a:r>
             <a:r>
               <a:rPr lang="ru-RU" dirty="0" smtClean="0"/>
-              <a:t> кодировки: </a:t>
-            </a:r>
-            <a:r>
-              <a:rPr lang="ru-RU" dirty="0" smtClean="0"/>
-              <a:t>семейство </a:t>
+              <a:t> кодировки: семейство </a:t>
             </a:r>
             <a:r>
               <a:rPr lang="en-US" dirty="0" smtClean="0"/>
@@ -6124,11 +6113,7 @@
             </a:r>
             <a:r>
               <a:rPr lang="ru-RU" dirty="0" smtClean="0"/>
-              <a:t>японский) и </a:t>
-            </a:r>
-            <a:r>
-              <a:rPr lang="ru-RU" dirty="0" smtClean="0"/>
-              <a:t>другие.</a:t>
+              <a:t>японский) и другие.</a:t>
             </a:r>
             <a:endParaRPr lang="en-US" dirty="0" smtClean="0"/>
           </a:p>
@@ -6144,11 +6129,7 @@
             </a:pPr>
             <a:r>
               <a:rPr lang="ru-RU" dirty="0" smtClean="0"/>
-              <a:t>Самой </a:t>
-            </a:r>
-            <a:r>
-              <a:rPr lang="ru-RU" dirty="0" smtClean="0"/>
-              <a:t>популярной многобайтовой кодировкой является </a:t>
+              <a:t>Самой популярной многобайтовой кодировкой является </a:t>
             </a:r>
             <a:r>
               <a:rPr lang="en-US" dirty="0" smtClean="0"/>
@@ -6179,6 +6160,272 @@
 </file>
 
 <file path=ppt/slides/slide11.xml><?xml version="1.0" encoding="utf-8"?>
+<p:sld xmlns:a="http://schemas.openxmlformats.org/drawingml/2006/main" xmlns:r="http://schemas.openxmlformats.org/officeDocument/2006/relationships" xmlns:p="http://schemas.openxmlformats.org/presentationml/2006/main">
+  <p:cSld>
+    <p:spTree>
+      <p:nvGrpSpPr>
+        <p:cNvPr id="1" name=""/>
+        <p:cNvGrpSpPr/>
+        <p:nvPr/>
+      </p:nvGrpSpPr>
+      <p:grpSpPr>
+        <a:xfrm>
+          <a:off x="0" y="0"/>
+          <a:ext cx="0" cy="0"/>
+          <a:chOff x="0" y="0"/>
+          <a:chExt cx="0" cy="0"/>
+        </a:xfrm>
+      </p:grpSpPr>
+      <p:sp>
+        <p:nvSpPr>
+          <p:cNvPr id="2" name="Title 1"/>
+          <p:cNvSpPr>
+            <a:spLocks noGrp="1"/>
+          </p:cNvSpPr>
+          <p:nvPr>
+            <p:ph type="title"/>
+          </p:nvPr>
+        </p:nvSpPr>
+        <p:spPr/>
+        <p:txBody>
+          <a:bodyPr>
+            <a:normAutofit fontScale="90000"/>
+          </a:bodyPr>
+          <a:lstStyle/>
+          <a:p>
+            <a:r>
+              <a:rPr lang="ru-RU" dirty="0" smtClean="0"/>
+              <a:t>Кодировки </a:t>
+            </a:r>
+            <a:r>
+              <a:rPr lang="ru-RU" dirty="0" smtClean="0"/>
+              <a:t>текста</a:t>
+            </a:r>
+            <a:r>
+              <a:rPr lang="en-US" dirty="0"/>
+              <a:t/>
+            </a:r>
+            <a:br>
+              <a:rPr lang="en-US" dirty="0"/>
+            </a:br>
+            <a:r>
+              <a:rPr lang="ru-RU" dirty="0" smtClean="0"/>
+              <a:t>Полезные ссылки</a:t>
+            </a:r>
+            <a:endParaRPr lang="ru-RU" dirty="0"/>
+          </a:p>
+        </p:txBody>
+      </p:sp>
+      <p:sp>
+        <p:nvSpPr>
+          <p:cNvPr id="3" name="Content Placeholder 2"/>
+          <p:cNvSpPr>
+            <a:spLocks noGrp="1"/>
+          </p:cNvSpPr>
+          <p:nvPr>
+            <p:ph idx="1"/>
+          </p:nvPr>
+        </p:nvSpPr>
+        <p:spPr/>
+        <p:txBody>
+          <a:bodyPr>
+            <a:normAutofit/>
+          </a:bodyPr>
+          <a:lstStyle/>
+          <a:p>
+            <a:r>
+              <a:rPr lang="ru-RU" sz="2800" dirty="0" smtClean="0">
+                <a:solidFill>
+                  <a:schemeClr val="bg1"/>
+                </a:solidFill>
+              </a:rPr>
+              <a:t>«Абсолютный </a:t>
+            </a:r>
+            <a:r>
+              <a:rPr lang="ru-RU" sz="2800" dirty="0">
+                <a:solidFill>
+                  <a:schemeClr val="bg1"/>
+                </a:solidFill>
+              </a:rPr>
+              <a:t>Минимум, который Каждый Разработчик Программного Обеспечения Обязательно Должен Знать о Unicode и </a:t>
+            </a:r>
+            <a:r>
+              <a:rPr lang="ru-RU" sz="2800" dirty="0" smtClean="0">
+                <a:solidFill>
+                  <a:schemeClr val="bg1"/>
+                </a:solidFill>
+              </a:rPr>
+              <a:t>Наборах»</a:t>
+            </a:r>
+            <a:r>
+              <a:rPr lang="en-US" sz="2800" dirty="0" smtClean="0">
+                <a:solidFill>
+                  <a:schemeClr val="bg1"/>
+                </a:solidFill>
+              </a:rPr>
+              <a:t>. </a:t>
+            </a:r>
+            <a:r>
+              <a:rPr lang="ru-RU" sz="2800" dirty="0">
+                <a:solidFill>
+                  <a:schemeClr val="bg1"/>
+                </a:solidFill>
+              </a:rPr>
+              <a:t>Статья Джоеля Спольски (</a:t>
+            </a:r>
+            <a:r>
+              <a:rPr lang="en-US" sz="2800" dirty="0"/>
+              <a:t>Joel </a:t>
+            </a:r>
+            <a:r>
+              <a:rPr lang="en-US" sz="2800" dirty="0" err="1"/>
+              <a:t>Spolsky</a:t>
+            </a:r>
+            <a:r>
+              <a:rPr lang="ru-RU" sz="2800" dirty="0" smtClean="0">
+                <a:solidFill>
+                  <a:schemeClr val="bg1"/>
+                </a:solidFill>
+              </a:rPr>
+              <a:t>).</a:t>
+            </a:r>
+            <a:endParaRPr lang="ru-RU" sz="2800" dirty="0">
+              <a:solidFill>
+                <a:schemeClr val="bg1"/>
+              </a:solidFill>
+            </a:endParaRPr>
+          </a:p>
+          <a:p>
+            <a:pPr lvl="1"/>
+            <a:r>
+              <a:rPr lang="ru-RU" dirty="0" smtClean="0">
+                <a:solidFill>
+                  <a:schemeClr val="bg1"/>
+                </a:solidFill>
+              </a:rPr>
+              <a:t>На </a:t>
+            </a:r>
+            <a:r>
+              <a:rPr lang="ru-RU" dirty="0" smtClean="0">
+                <a:solidFill>
+                  <a:schemeClr val="bg1"/>
+                </a:solidFill>
+                <a:hlinkClick r:id="rId2"/>
+              </a:rPr>
+              <a:t>русском</a:t>
+            </a:r>
+            <a:r>
+              <a:rPr lang="ru-RU" dirty="0" smtClean="0">
+                <a:solidFill>
+                  <a:schemeClr val="bg1"/>
+                </a:solidFill>
+              </a:rPr>
+              <a:t> и </a:t>
+            </a:r>
+            <a:r>
+              <a:rPr lang="ru-RU" dirty="0" smtClean="0">
+                <a:solidFill>
+                  <a:schemeClr val="bg1"/>
+                </a:solidFill>
+                <a:hlinkClick r:id="rId3"/>
+              </a:rPr>
+              <a:t>английском</a:t>
+            </a:r>
+            <a:r>
+              <a:rPr lang="ru-RU" dirty="0" smtClean="0">
+                <a:solidFill>
+                  <a:schemeClr val="bg1"/>
+                </a:solidFill>
+              </a:rPr>
+              <a:t>.</a:t>
+            </a:r>
+          </a:p>
+          <a:p>
+            <a:r>
+              <a:rPr lang="en-US" sz="2800" dirty="0">
+                <a:solidFill>
+                  <a:schemeClr val="bg1"/>
+                </a:solidFill>
+                <a:hlinkClick r:id="rId4"/>
+              </a:rPr>
+              <a:t>http://</a:t>
+            </a:r>
+            <a:r>
+              <a:rPr lang="en-US" sz="2800" dirty="0" smtClean="0">
+                <a:solidFill>
+                  <a:schemeClr val="bg1"/>
+                </a:solidFill>
+                <a:hlinkClick r:id="rId4"/>
+              </a:rPr>
+              <a:t>www.fileformat.info/info/unicode/index.htm</a:t>
+            </a:r>
+            <a:endParaRPr lang="ru-RU" sz="2800" dirty="0" smtClean="0">
+              <a:solidFill>
+                <a:schemeClr val="bg1"/>
+              </a:solidFill>
+            </a:endParaRPr>
+          </a:p>
+          <a:p>
+            <a:r>
+              <a:rPr lang="en-US" sz="2800" dirty="0"/>
+              <a:t>The Unicode Consortium </a:t>
+            </a:r>
+            <a:r>
+              <a:rPr lang="ru-RU" sz="2800" dirty="0" smtClean="0"/>
+              <a:t>- </a:t>
+            </a:r>
+            <a:r>
+              <a:rPr lang="en-US" sz="2800" dirty="0" smtClean="0">
+                <a:solidFill>
+                  <a:schemeClr val="bg1"/>
+                </a:solidFill>
+                <a:hlinkClick r:id="rId5"/>
+              </a:rPr>
+              <a:t>http</a:t>
+            </a:r>
+            <a:r>
+              <a:rPr lang="en-US" sz="2800" dirty="0">
+                <a:solidFill>
+                  <a:schemeClr val="bg1"/>
+                </a:solidFill>
+                <a:hlinkClick r:id="rId5"/>
+              </a:rPr>
+              <a:t>://unicode.org</a:t>
+            </a:r>
+            <a:r>
+              <a:rPr lang="en-US" sz="2800" dirty="0" smtClean="0">
+                <a:solidFill>
+                  <a:schemeClr val="bg1"/>
+                </a:solidFill>
+                <a:hlinkClick r:id="rId5"/>
+              </a:rPr>
+              <a:t>/</a:t>
+            </a:r>
+            <a:endParaRPr lang="ru-RU" sz="2800" dirty="0"/>
+          </a:p>
+        </p:txBody>
+      </p:sp>
+    </p:spTree>
+    <p:extLst>
+      <p:ext uri="{BB962C8B-B14F-4D97-AF65-F5344CB8AC3E}">
+        <p14:creationId xmlns:p14="http://schemas.microsoft.com/office/powerpoint/2010/main" val="629239500"/>
+      </p:ext>
+    </p:extLst>
+  </p:cSld>
+  <p:clrMapOvr>
+    <a:masterClrMapping/>
+  </p:clrMapOvr>
+  <p:timing>
+    <p:tnLst>
+      <p:par>
+        <p:cTn id="1" dur="indefinite" restart="never" nodeType="tmRoot"/>
+      </p:par>
+    </p:tnLst>
+  </p:timing>
+</p:sld>
+</file>
+
+<file path=ppt/slides/slide12.xml><?xml version="1.0" encoding="utf-8"?>
 <p:sld xmlns:a="http://schemas.openxmlformats.org/drawingml/2006/main" xmlns:r="http://schemas.openxmlformats.org/officeDocument/2006/relationships" xmlns:p="http://schemas.openxmlformats.org/presentationml/2006/main">
   <p:cSld>
     <p:spTree>
@@ -6854,7 +7101,7 @@
 </p:sld>
 </file>
 
-<file path=ppt/slides/slide12.xml><?xml version="1.0" encoding="utf-8"?>
+<file path=ppt/slides/slide13.xml><?xml version="1.0" encoding="utf-8"?>
 <p:sld xmlns:a="http://schemas.openxmlformats.org/drawingml/2006/main" xmlns:r="http://schemas.openxmlformats.org/officeDocument/2006/relationships" xmlns:p="http://schemas.openxmlformats.org/presentationml/2006/main">
   <p:cSld>
     <p:bg>
@@ -7921,7 +8168,7 @@
 </p:sld>
 </file>
 
-<file path=ppt/slides/slide13.xml><?xml version="1.0" encoding="utf-8"?>
+<file path=ppt/slides/slide14.xml><?xml version="1.0" encoding="utf-8"?>
 <p:sld xmlns:a="http://schemas.openxmlformats.org/drawingml/2006/main" xmlns:r="http://schemas.openxmlformats.org/officeDocument/2006/relationships" xmlns:p="http://schemas.openxmlformats.org/presentationml/2006/main">
   <p:cSld>
     <p:bg>
@@ -10208,7 +10455,7 @@
 </p:sld>
 </file>
 
-<file path=ppt/slides/slide14.xml><?xml version="1.0" encoding="utf-8"?>
+<file path=ppt/slides/slide15.xml><?xml version="1.0" encoding="utf-8"?>
 <p:sld xmlns:a="http://schemas.openxmlformats.org/drawingml/2006/main" xmlns:r="http://schemas.openxmlformats.org/officeDocument/2006/relationships" xmlns:p="http://schemas.openxmlformats.org/presentationml/2006/main">
   <p:cSld>
     <p:bg>
@@ -11229,7 +11476,7 @@
 </p:sld>
 </file>
 
-<file path=ppt/slides/slide15.xml><?xml version="1.0" encoding="utf-8"?>
+<file path=ppt/slides/slide16.xml><?xml version="1.0" encoding="utf-8"?>
 <p:sld xmlns:a="http://schemas.openxmlformats.org/drawingml/2006/main" xmlns:r="http://schemas.openxmlformats.org/officeDocument/2006/relationships" xmlns:p="http://schemas.openxmlformats.org/presentationml/2006/main">
   <p:cSld>
     <p:bg>

</xml_diff>

<commit_message>
Added link to Expresso (regular expression tool)
</commit_message>
<xml_diff>
--- a/Presentation/lesson-03.pptx
+++ b/Presentation/lesson-03.pptx
@@ -305,7 +305,7 @@
           <a:p>
             <a:fld id="{6D622FCB-595C-4A19-9DA3-A5F2C1EA723F}" type="datetimeFigureOut">
               <a:rPr lang="en-US" smtClean="0"/>
-              <a:t>8/28/2014</a:t>
+              <a:t>8/20/2015</a:t>
             </a:fld>
             <a:endParaRPr lang="en-US"/>
           </a:p>
@@ -475,7 +475,7 @@
           <a:p>
             <a:fld id="{6D622FCB-595C-4A19-9DA3-A5F2C1EA723F}" type="datetimeFigureOut">
               <a:rPr lang="en-US" smtClean="0"/>
-              <a:t>8/28/2014</a:t>
+              <a:t>8/20/2015</a:t>
             </a:fld>
             <a:endParaRPr lang="en-US"/>
           </a:p>
@@ -655,7 +655,7 @@
           <a:p>
             <a:fld id="{6D622FCB-595C-4A19-9DA3-A5F2C1EA723F}" type="datetimeFigureOut">
               <a:rPr lang="en-US" smtClean="0"/>
-              <a:t>8/28/2014</a:t>
+              <a:t>8/20/2015</a:t>
             </a:fld>
             <a:endParaRPr lang="en-US"/>
           </a:p>
@@ -2040,7 +2040,7 @@
           <a:p>
             <a:fld id="{6D622FCB-595C-4A19-9DA3-A5F2C1EA723F}" type="datetimeFigureOut">
               <a:rPr lang="en-US" smtClean="0"/>
-              <a:t>8/28/2014</a:t>
+              <a:t>8/20/2015</a:t>
             </a:fld>
             <a:endParaRPr lang="en-US"/>
           </a:p>
@@ -2913,7 +2913,7 @@
                 </a:solidFill>
               </a:rPr>
               <a:pPr/>
-              <a:t>28.08.2014</a:t>
+              <a:t>20.08.2015</a:t>
             </a:fld>
             <a:endParaRPr lang="ru-RU">
               <a:solidFill>
@@ -3184,7 +3184,7 @@
           <a:p>
             <a:fld id="{6D622FCB-595C-4A19-9DA3-A5F2C1EA723F}" type="datetimeFigureOut">
               <a:rPr lang="en-US" smtClean="0"/>
-              <a:t>8/28/2014</a:t>
+              <a:t>8/20/2015</a:t>
             </a:fld>
             <a:endParaRPr lang="en-US"/>
           </a:p>
@@ -3472,7 +3472,7 @@
           <a:p>
             <a:fld id="{6D622FCB-595C-4A19-9DA3-A5F2C1EA723F}" type="datetimeFigureOut">
               <a:rPr lang="en-US" smtClean="0"/>
-              <a:t>8/28/2014</a:t>
+              <a:t>8/20/2015</a:t>
             </a:fld>
             <a:endParaRPr lang="en-US"/>
           </a:p>
@@ -3894,7 +3894,7 @@
           <a:p>
             <a:fld id="{6D622FCB-595C-4A19-9DA3-A5F2C1EA723F}" type="datetimeFigureOut">
               <a:rPr lang="en-US" smtClean="0"/>
-              <a:t>8/28/2014</a:t>
+              <a:t>8/20/2015</a:t>
             </a:fld>
             <a:endParaRPr lang="en-US"/>
           </a:p>
@@ -4012,7 +4012,7 @@
           <a:p>
             <a:fld id="{6D622FCB-595C-4A19-9DA3-A5F2C1EA723F}" type="datetimeFigureOut">
               <a:rPr lang="en-US" smtClean="0"/>
-              <a:t>8/28/2014</a:t>
+              <a:t>8/20/2015</a:t>
             </a:fld>
             <a:endParaRPr lang="en-US"/>
           </a:p>
@@ -4107,7 +4107,7 @@
           <a:p>
             <a:fld id="{6D622FCB-595C-4A19-9DA3-A5F2C1EA723F}" type="datetimeFigureOut">
               <a:rPr lang="en-US" smtClean="0"/>
-              <a:t>8/28/2014</a:t>
+              <a:t>8/20/2015</a:t>
             </a:fld>
             <a:endParaRPr lang="en-US"/>
           </a:p>
@@ -4384,7 +4384,7 @@
           <a:p>
             <a:fld id="{6D622FCB-595C-4A19-9DA3-A5F2C1EA723F}" type="datetimeFigureOut">
               <a:rPr lang="en-US" smtClean="0"/>
-              <a:t>8/28/2014</a:t>
+              <a:t>8/20/2015</a:t>
             </a:fld>
             <a:endParaRPr lang="en-US"/>
           </a:p>
@@ -4637,7 +4637,7 @@
           <a:p>
             <a:fld id="{6D622FCB-595C-4A19-9DA3-A5F2C1EA723F}" type="datetimeFigureOut">
               <a:rPr lang="en-US" smtClean="0"/>
-              <a:t>8/28/2014</a:t>
+              <a:t>8/20/2015</a:t>
             </a:fld>
             <a:endParaRPr lang="en-US"/>
           </a:p>
@@ -4850,7 +4850,7 @@
           <a:p>
             <a:fld id="{6D622FCB-595C-4A19-9DA3-A5F2C1EA723F}" type="datetimeFigureOut">
               <a:rPr lang="en-US" smtClean="0"/>
-              <a:t>8/28/2014</a:t>
+              <a:t>8/20/2015</a:t>
             </a:fld>
             <a:endParaRPr lang="en-US"/>
           </a:p>
@@ -5376,7 +5376,7 @@
                 </a:solidFill>
               </a:rPr>
               <a:pPr/>
-              <a:t>28.08.2014</a:t>
+              <a:t>20.08.2015</a:t>
             </a:fld>
             <a:endParaRPr lang="ru-RU">
               <a:solidFill>
@@ -11313,6 +11313,131 @@
           </a:graphicData>
         </a:graphic>
       </p:graphicFrame>
+      <p:sp>
+        <p:nvSpPr>
+          <p:cNvPr id="7" name="Rectangle 1"/>
+          <p:cNvSpPr>
+            <a:spLocks noChangeArrowheads="1"/>
+          </p:cNvSpPr>
+          <p:nvPr/>
+        </p:nvSpPr>
+        <p:spPr bwMode="auto">
+          <a:xfrm>
+            <a:off x="309673" y="6093296"/>
+            <a:ext cx="8610600" cy="523220"/>
+          </a:xfrm>
+          <a:prstGeom prst="rect">
+            <a:avLst/>
+          </a:prstGeom>
+          <a:noFill/>
+          <a:ln>
+            <a:noFill/>
+          </a:ln>
+          <a:extLst>
+            <a:ext uri="{909E8E84-426E-40DD-AFC4-6F175D3DCCD1}">
+              <a14:hiddenFill xmlns:a14="http://schemas.microsoft.com/office/drawing/2010/main">
+                <a:solidFill>
+                  <a:srgbClr val="FFFFFF"/>
+                </a:solidFill>
+              </a14:hiddenFill>
+            </a:ext>
+            <a:ext uri="{91240B29-F687-4F45-9708-019B960494DF}">
+              <a14:hiddenLine xmlns:a14="http://schemas.microsoft.com/office/drawing/2010/main" w="9525">
+                <a:solidFill>
+                  <a:srgbClr val="000000"/>
+                </a:solidFill>
+                <a:miter lim="800000"/>
+                <a:headEnd/>
+                <a:tailEnd/>
+              </a14:hiddenLine>
+            </a:ext>
+          </a:extLst>
+        </p:spPr>
+        <p:txBody>
+          <a:bodyPr anchor="ctr">
+            <a:spAutoFit/>
+          </a:bodyPr>
+          <a:lstStyle/>
+          <a:p>
+            <a:pPr eaLnBrk="0" hangingPunct="0"/>
+            <a:r>
+              <a:rPr lang="ru-RU" sz="1400" dirty="0" smtClean="0">
+                <a:solidFill>
+                  <a:schemeClr val="bg1"/>
+                </a:solidFill>
+                <a:latin typeface="Courier New" pitchFamily="49" charset="0"/>
+                <a:ea typeface="Calibri" pitchFamily="34" charset="0"/>
+                <a:cs typeface="Courier New" pitchFamily="49" charset="0"/>
+              </a:rPr>
+              <a:t>Для тренировки с регулярными выражениями используйте бесплатное приложение </a:t>
+            </a:r>
+            <a:r>
+              <a:rPr lang="en-US" sz="1400" dirty="0" smtClean="0">
+                <a:solidFill>
+                  <a:schemeClr val="bg1"/>
+                </a:solidFill>
+                <a:latin typeface="Courier New" pitchFamily="49" charset="0"/>
+                <a:ea typeface="Calibri" pitchFamily="34" charset="0"/>
+                <a:cs typeface="Courier New" pitchFamily="49" charset="0"/>
+              </a:rPr>
+              <a:t>Expresso</a:t>
+            </a:r>
+            <a:r>
+              <a:rPr lang="ru-RU" sz="1400" dirty="0" smtClean="0">
+                <a:solidFill>
+                  <a:schemeClr val="bg1"/>
+                </a:solidFill>
+                <a:latin typeface="Courier New" pitchFamily="49" charset="0"/>
+                <a:ea typeface="Calibri" pitchFamily="34" charset="0"/>
+                <a:cs typeface="Courier New" pitchFamily="49" charset="0"/>
+              </a:rPr>
+              <a:t> (</a:t>
+            </a:r>
+            <a:r>
+              <a:rPr lang="en-US" sz="1400" dirty="0">
+                <a:solidFill>
+                  <a:schemeClr val="bg1"/>
+                </a:solidFill>
+                <a:latin typeface="Courier New" pitchFamily="49" charset="0"/>
+                <a:ea typeface="Calibri" pitchFamily="34" charset="0"/>
+                <a:cs typeface="Courier New" pitchFamily="49" charset="0"/>
+                <a:hlinkClick r:id="rId3"/>
+              </a:rPr>
+              <a:t>http://</a:t>
+            </a:r>
+            <a:r>
+              <a:rPr lang="en-US" sz="1400" dirty="0" smtClean="0">
+                <a:solidFill>
+                  <a:schemeClr val="bg1"/>
+                </a:solidFill>
+                <a:latin typeface="Courier New" pitchFamily="49" charset="0"/>
+                <a:ea typeface="Calibri" pitchFamily="34" charset="0"/>
+                <a:cs typeface="Courier New" pitchFamily="49" charset="0"/>
+                <a:hlinkClick r:id="rId3"/>
+              </a:rPr>
+              <a:t>www.ultrapico.com/Expresso.htm</a:t>
+            </a:r>
+            <a:r>
+              <a:rPr lang="ru-RU" sz="1400" dirty="0" smtClean="0">
+                <a:solidFill>
+                  <a:schemeClr val="bg1"/>
+                </a:solidFill>
+                <a:latin typeface="Courier New" pitchFamily="49" charset="0"/>
+                <a:ea typeface="Calibri" pitchFamily="34" charset="0"/>
+                <a:cs typeface="Courier New" pitchFamily="49" charset="0"/>
+              </a:rPr>
+              <a:t>).</a:t>
+            </a:r>
+            <a:endParaRPr lang="be-BY" sz="1400" dirty="0">
+              <a:solidFill>
+                <a:schemeClr val="bg1"/>
+              </a:solidFill>
+              <a:ea typeface="Calibri" pitchFamily="34" charset="0"/>
+              <a:cs typeface="Courier New" pitchFamily="49" charset="0"/>
+            </a:endParaRPr>
+          </a:p>
+        </p:txBody>
+      </p:sp>
     </p:spTree>
     <p:extLst>
       <p:ext uri="{BB962C8B-B14F-4D97-AF65-F5344CB8AC3E}">

</xml_diff>